<commit_message>
intervalli di confidenza in presentazione
</commit_message>
<xml_diff>
--- a/Presentation_Gotti_Mazzoleni.pptx
+++ b/Presentation_Gotti_Mazzoleni.pptx
@@ -10957,8 +10957,8 @@
           </a:p>
         </p:txBody>
       </p:sp>
-      <mc:AlternateContent xmlns:mc="http://schemas.openxmlformats.org/markup-compatibility/2006" xmlns:a14="http://schemas.microsoft.com/office/drawing/2010/main">
-        <mc:Choice Requires="a14">
+      <mc:AlternateContent xmlns:mc="http://schemas.openxmlformats.org/markup-compatibility/2006">
+        <mc:Choice xmlns:a14="http://schemas.microsoft.com/office/drawing/2010/main" Requires="a14">
           <p:sp>
             <p:nvSpPr>
               <p:cNvPr id="6" name="CasellaDiTesto 5">
@@ -10973,8 +10973,8 @@
             </p:nvSpPr>
             <p:spPr>
               <a:xfrm>
-                <a:off x="762000" y="1641626"/>
-                <a:ext cx="10515600" cy="830997"/>
+                <a:off x="762001" y="1641626"/>
+                <a:ext cx="4876800" cy="1200329"/>
               </a:xfrm>
               <a:prstGeom prst="rect">
                 <a:avLst/>
@@ -10987,7 +10987,7 @@
               </a:bodyPr>
               <a:lstStyle/>
               <a:p>
-                <a:pPr marL="0" indent="0">
+                <a:pPr marL="0" indent="0" algn="just">
                   <a:buNone/>
                 </a:pPr>
                 <a:r>
@@ -10998,7 +10998,7 @@
                     <a:latin typeface="Arial" panose="020B0604020202020204" pitchFamily="34" charset="0"/>
                     <a:cs typeface="Arial" panose="020B0604020202020204" pitchFamily="34" charset="0"/>
                   </a:rPr>
-                  <a:t>Using full dataset for training, </a:t>
+                  <a:t>Using the full dataset for training, </a:t>
                 </a:r>
                 <a:r>
                   <a:rPr lang="en-GB" sz="2400" b="1" dirty="0">
@@ -11038,7 +11038,22 @@
                     <a:latin typeface="Arial" panose="020B0604020202020204" pitchFamily="34" charset="0"/>
                     <a:cs typeface="Arial" panose="020B0604020202020204" pitchFamily="34" charset="0"/>
                   </a:rPr>
-                  <a:t>=95% on new data is </a:t>
+                  <a:t> = 95% </a:t>
+                </a:r>
+              </a:p>
+              <a:p>
+                <a:pPr marL="0" indent="0" algn="just">
+                  <a:buNone/>
+                </a:pPr>
+                <a:r>
+                  <a:rPr lang="it-IT" sz="2400" dirty="0">
+                    <a:solidFill>
+                      <a:schemeClr val="tx1"/>
+                    </a:solidFill>
+                    <a:latin typeface="Arial" panose="020B0604020202020204" pitchFamily="34" charset="0"/>
+                    <a:cs typeface="Arial" panose="020B0604020202020204" pitchFamily="34" charset="0"/>
+                  </a:rPr>
+                  <a:t>on new data is </a:t>
                 </a:r>
                 <a14:m>
                   <m:oMath xmlns:m="http://schemas.openxmlformats.org/officeDocument/2006/math">
@@ -11084,7 +11099,7 @@
             </p:txBody>
           </p:sp>
         </mc:Choice>
-        <mc:Fallback xmlns="">
+        <mc:Fallback>
           <p:sp>
             <p:nvSpPr>
               <p:cNvPr id="6" name="CasellaDiTesto 5">
@@ -11101,8 +11116,8 @@
             </p:nvSpPr>
             <p:spPr>
               <a:xfrm>
-                <a:off x="762000" y="1641626"/>
-                <a:ext cx="10515600" cy="830997"/>
+                <a:off x="762001" y="1641626"/>
+                <a:ext cx="4876800" cy="1200329"/>
               </a:xfrm>
               <a:prstGeom prst="rect">
                 <a:avLst/>
@@ -11110,7 +11125,7 @@
               <a:blipFill>
                 <a:blip r:embed="rId2"/>
                 <a:stretch>
-                  <a:fillRect l="-870" t="-5109" r="-696" b="-16058"/>
+                  <a:fillRect l="-1875" t="-3553" r="-1875" b="-11168"/>
                 </a:stretch>
               </a:blipFill>
             </p:spPr>
@@ -11218,6 +11233,42 @@
           </a:p>
         </p:txBody>
       </p:sp>
+      <p:pic>
+        <p:nvPicPr>
+          <p:cNvPr id="3" name="Immagine 2" descr="Immagine che contiene testo, schermata, Carattere, numero&#10;&#10;Il contenuto generato dall'IA potrebbe non essere corretto.">
+            <a:extLst>
+              <a:ext uri="{FF2B5EF4-FFF2-40B4-BE49-F238E27FC236}">
+                <a16:creationId xmlns:a16="http://schemas.microsoft.com/office/drawing/2014/main" id="{A9F471B2-AF16-165D-2906-B277BBCA2389}"/>
+              </a:ext>
+            </a:extLst>
+          </p:cNvPr>
+          <p:cNvPicPr>
+            <a:picLocks noChangeAspect="1"/>
+          </p:cNvPicPr>
+          <p:nvPr/>
+        </p:nvPicPr>
+        <p:blipFill>
+          <a:blip r:embed="rId3">
+            <a:extLst>
+              <a:ext uri="{28A0092B-C50C-407E-A947-70E740481C1C}">
+                <a14:useLocalDpi xmlns:a14="http://schemas.microsoft.com/office/drawing/2010/main" val="0"/>
+              </a:ext>
+            </a:extLst>
+          </a:blip>
+          <a:stretch>
+            <a:fillRect/>
+          </a:stretch>
+        </p:blipFill>
+        <p:spPr>
+          <a:xfrm>
+            <a:off x="6019799" y="1641626"/>
+            <a:ext cx="4760171" cy="4149574"/>
+          </a:xfrm>
+          <a:prstGeom prst="rect">
+            <a:avLst/>
+          </a:prstGeom>
+        </p:spPr>
+      </p:pic>
     </p:spTree>
     <p:extLst>
       <p:ext uri="{BB962C8B-B14F-4D97-AF65-F5344CB8AC3E}">

</xml_diff>